<commit_message>
po meeting 2 voorbereid
</commit_message>
<xml_diff>
--- a/Planning/PO Meeting 1.pptx
+++ b/Planning/PO Meeting 1.pptx
@@ -287,7 +287,7 @@
           <a:p>
             <a:fld id="{48A87A34-81AB-432B-8DAE-1953F412C126}" type="datetimeFigureOut">
               <a:rPr lang="en-US" dirty="0"/>
-              <a:t>2/18/2020</a:t>
+              <a:t>3/10/2020</a:t>
             </a:fld>
             <a:endParaRPr lang="en-US" dirty="0"/>
           </a:p>
@@ -339,7 +339,7 @@
           <a:p>
             <a:fld id="{6D22F896-40B5-4ADD-8801-0D06FADFA095}" type="slidenum">
               <a:rPr lang="en-US" dirty="0"/>
-              <a:t>‹nr.›</a:t>
+              <a:t>‹#›</a:t>
             </a:fld>
             <a:endParaRPr lang="en-US" dirty="0"/>
           </a:p>
@@ -549,7 +549,7 @@
           <a:p>
             <a:fld id="{48A87A34-81AB-432B-8DAE-1953F412C126}" type="datetimeFigureOut">
               <a:rPr lang="en-US" dirty="0"/>
-              <a:t>2/18/2020</a:t>
+              <a:t>3/10/2020</a:t>
             </a:fld>
             <a:endParaRPr lang="en-US" dirty="0"/>
           </a:p>
@@ -591,7 +591,7 @@
           <a:p>
             <a:fld id="{6D22F896-40B5-4ADD-8801-0D06FADFA095}" type="slidenum">
               <a:rPr lang="en-US" dirty="0"/>
-              <a:t>‹nr.›</a:t>
+              <a:t>‹#›</a:t>
             </a:fld>
             <a:endParaRPr lang="en-US" dirty="0"/>
           </a:p>
@@ -776,7 +776,7 @@
             <a:fld id="{48A87A34-81AB-432B-8DAE-1953F412C126}" type="datetimeFigureOut">
               <a:rPr lang="en-US" dirty="0"/>
               <a:pPr/>
-              <a:t>2/18/2020</a:t>
+              <a:t>3/10/2020</a:t>
             </a:fld>
             <a:endParaRPr lang="en-US" dirty="0"/>
           </a:p>
@@ -828,7 +828,7 @@
           <a:p>
             <a:fld id="{6D22F896-40B5-4ADD-8801-0D06FADFA095}" type="slidenum">
               <a:rPr lang="en-US" dirty="0"/>
-              <a:t>‹nr.›</a:t>
+              <a:t>‹#›</a:t>
             </a:fld>
             <a:endParaRPr lang="en-US" dirty="0"/>
           </a:p>
@@ -1082,7 +1082,7 @@
             <a:fld id="{48A87A34-81AB-432B-8DAE-1953F412C126}" type="datetimeFigureOut">
               <a:rPr lang="en-US" dirty="0"/>
               <a:pPr/>
-              <a:t>2/18/2020</a:t>
+              <a:t>3/10/2020</a:t>
             </a:fld>
             <a:endParaRPr lang="en-US" dirty="0"/>
           </a:p>
@@ -1134,7 +1134,7 @@
           <a:p>
             <a:fld id="{6D22F896-40B5-4ADD-8801-0D06FADFA095}" type="slidenum">
               <a:rPr lang="en-US" dirty="0"/>
-              <a:t>‹nr.›</a:t>
+              <a:t>‹#›</a:t>
             </a:fld>
             <a:endParaRPr lang="en-US" dirty="0"/>
           </a:p>
@@ -1551,7 +1551,7 @@
             <a:fld id="{48A87A34-81AB-432B-8DAE-1953F412C126}" type="datetimeFigureOut">
               <a:rPr lang="en-US" dirty="0"/>
               <a:pPr/>
-              <a:t>2/18/2020</a:t>
+              <a:t>3/10/2020</a:t>
             </a:fld>
             <a:endParaRPr lang="en-US" dirty="0"/>
           </a:p>
@@ -1603,7 +1603,7 @@
           <a:p>
             <a:fld id="{6D22F896-40B5-4ADD-8801-0D06FADFA095}" type="slidenum">
               <a:rPr lang="en-US" dirty="0"/>
-              <a:t>‹nr.›</a:t>
+              <a:t>‹#›</a:t>
             </a:fld>
             <a:endParaRPr lang="en-US" dirty="0"/>
           </a:p>
@@ -2093,7 +2093,7 @@
           <a:p>
             <a:fld id="{48A87A34-81AB-432B-8DAE-1953F412C126}" type="datetimeFigureOut">
               <a:rPr lang="en-US" dirty="0"/>
-              <a:t>2/18/2020</a:t>
+              <a:t>3/10/2020</a:t>
             </a:fld>
             <a:endParaRPr lang="en-US" dirty="0"/>
           </a:p>
@@ -2135,7 +2135,7 @@
           <a:p>
             <a:fld id="{6D22F896-40B5-4ADD-8801-0D06FADFA095}" type="slidenum">
               <a:rPr lang="en-US" dirty="0"/>
-              <a:t>‹nr.›</a:t>
+              <a:t>‹#›</a:t>
             </a:fld>
             <a:endParaRPr lang="en-US" dirty="0"/>
           </a:p>
@@ -2862,7 +2862,7 @@
           <a:p>
             <a:fld id="{48A87A34-81AB-432B-8DAE-1953F412C126}" type="datetimeFigureOut">
               <a:rPr lang="en-US" dirty="0"/>
-              <a:t>2/18/2020</a:t>
+              <a:t>3/10/2020</a:t>
             </a:fld>
             <a:endParaRPr lang="en-US" dirty="0"/>
           </a:p>
@@ -2904,7 +2904,7 @@
           <a:p>
             <a:fld id="{6D22F896-40B5-4ADD-8801-0D06FADFA095}" type="slidenum">
               <a:rPr lang="en-US" dirty="0"/>
-              <a:t>‹nr.›</a:t>
+              <a:t>‹#›</a:t>
             </a:fld>
             <a:endParaRPr lang="en-US" dirty="0"/>
           </a:p>
@@ -3032,7 +3032,7 @@
           <a:p>
             <a:fld id="{48A87A34-81AB-432B-8DAE-1953F412C126}" type="datetimeFigureOut">
               <a:rPr lang="en-US" dirty="0"/>
-              <a:t>2/18/2020</a:t>
+              <a:t>3/10/2020</a:t>
             </a:fld>
             <a:endParaRPr lang="en-US" dirty="0"/>
           </a:p>
@@ -3074,7 +3074,7 @@
           <a:p>
             <a:fld id="{6D22F896-40B5-4ADD-8801-0D06FADFA095}" type="slidenum">
               <a:rPr lang="en-US" dirty="0"/>
-              <a:t>‹nr.›</a:t>
+              <a:t>‹#›</a:t>
             </a:fld>
             <a:endParaRPr lang="en-US" dirty="0"/>
           </a:p>
@@ -3251,7 +3251,7 @@
             <a:fld id="{48A87A34-81AB-432B-8DAE-1953F412C126}" type="datetimeFigureOut">
               <a:rPr lang="en-US" dirty="0"/>
               <a:pPr/>
-              <a:t>2/18/2020</a:t>
+              <a:t>3/10/2020</a:t>
             </a:fld>
             <a:endParaRPr lang="en-US" dirty="0"/>
           </a:p>
@@ -3303,7 +3303,7 @@
           <a:p>
             <a:fld id="{6D22F896-40B5-4ADD-8801-0D06FADFA095}" type="slidenum">
               <a:rPr lang="en-US" dirty="0"/>
-              <a:t>‹nr.›</a:t>
+              <a:t>‹#›</a:t>
             </a:fld>
             <a:endParaRPr lang="en-US" dirty="0"/>
           </a:p>
@@ -3426,7 +3426,7 @@
           <a:p>
             <a:fld id="{48A87A34-81AB-432B-8DAE-1953F412C126}" type="datetimeFigureOut">
               <a:rPr lang="en-US" dirty="0"/>
-              <a:t>2/18/2020</a:t>
+              <a:t>3/10/2020</a:t>
             </a:fld>
             <a:endParaRPr lang="en-US" dirty="0"/>
           </a:p>
@@ -3468,7 +3468,7 @@
           <a:p>
             <a:fld id="{6D22F896-40B5-4ADD-8801-0D06FADFA095}" type="slidenum">
               <a:rPr lang="en-US" dirty="0"/>
-              <a:t>‹nr.›</a:t>
+              <a:t>‹#›</a:t>
             </a:fld>
             <a:endParaRPr lang="en-US" dirty="0"/>
           </a:p>
@@ -3711,7 +3711,7 @@
             <a:fld id="{48A87A34-81AB-432B-8DAE-1953F412C126}" type="datetimeFigureOut">
               <a:rPr lang="en-US" dirty="0"/>
               <a:pPr/>
-              <a:t>2/18/2020</a:t>
+              <a:t>3/10/2020</a:t>
             </a:fld>
             <a:endParaRPr lang="en-US" dirty="0"/>
           </a:p>
@@ -3763,7 +3763,7 @@
           <a:p>
             <a:fld id="{6D22F896-40B5-4ADD-8801-0D06FADFA095}" type="slidenum">
               <a:rPr lang="en-US" dirty="0"/>
-              <a:t>‹nr.›</a:t>
+              <a:t>‹#›</a:t>
             </a:fld>
             <a:endParaRPr lang="en-US" dirty="0"/>
           </a:p>
@@ -3948,7 +3948,7 @@
           <a:p>
             <a:fld id="{48A87A34-81AB-432B-8DAE-1953F412C126}" type="datetimeFigureOut">
               <a:rPr lang="en-US" dirty="0"/>
-              <a:t>2/18/2020</a:t>
+              <a:t>3/10/2020</a:t>
             </a:fld>
             <a:endParaRPr lang="en-US" dirty="0"/>
           </a:p>
@@ -3990,7 +3990,7 @@
           <a:p>
             <a:fld id="{6D22F896-40B5-4ADD-8801-0D06FADFA095}" type="slidenum">
               <a:rPr lang="en-US" dirty="0"/>
-              <a:t>‹nr.›</a:t>
+              <a:t>‹#›</a:t>
             </a:fld>
             <a:endParaRPr lang="en-US" dirty="0"/>
           </a:p>
@@ -4322,7 +4322,7 @@
           <a:p>
             <a:fld id="{48A87A34-81AB-432B-8DAE-1953F412C126}" type="datetimeFigureOut">
               <a:rPr lang="en-US" dirty="0"/>
-              <a:t>2/18/2020</a:t>
+              <a:t>3/10/2020</a:t>
             </a:fld>
             <a:endParaRPr lang="en-US" dirty="0"/>
           </a:p>
@@ -4364,7 +4364,7 @@
           <a:p>
             <a:fld id="{6D22F896-40B5-4ADD-8801-0D06FADFA095}" type="slidenum">
               <a:rPr lang="en-US" dirty="0"/>
-              <a:t>‹nr.›</a:t>
+              <a:t>‹#›</a:t>
             </a:fld>
             <a:endParaRPr lang="en-US" dirty="0"/>
           </a:p>
@@ -4435,7 +4435,7 @@
           <a:p>
             <a:fld id="{48A87A34-81AB-432B-8DAE-1953F412C126}" type="datetimeFigureOut">
               <a:rPr lang="en-US" dirty="0"/>
-              <a:t>2/18/2020</a:t>
+              <a:t>3/10/2020</a:t>
             </a:fld>
             <a:endParaRPr lang="en-US" dirty="0"/>
           </a:p>
@@ -4477,7 +4477,7 @@
           <a:p>
             <a:fld id="{6D22F896-40B5-4ADD-8801-0D06FADFA095}" type="slidenum">
               <a:rPr lang="en-US" dirty="0"/>
-              <a:t>‹nr.›</a:t>
+              <a:t>‹#›</a:t>
             </a:fld>
             <a:endParaRPr lang="en-US" dirty="0"/>
           </a:p>
@@ -4525,7 +4525,7 @@
           <a:p>
             <a:fld id="{48A87A34-81AB-432B-8DAE-1953F412C126}" type="datetimeFigureOut">
               <a:rPr lang="en-US" dirty="0"/>
-              <a:t>2/18/2020</a:t>
+              <a:t>3/10/2020</a:t>
             </a:fld>
             <a:endParaRPr lang="en-US" dirty="0"/>
           </a:p>
@@ -4567,7 +4567,7 @@
           <a:p>
             <a:fld id="{6D22F896-40B5-4ADD-8801-0D06FADFA095}" type="slidenum">
               <a:rPr lang="en-US" dirty="0"/>
-              <a:t>‹nr.›</a:t>
+              <a:t>‹#›</a:t>
             </a:fld>
             <a:endParaRPr lang="en-US" dirty="0"/>
           </a:p>
@@ -4769,7 +4769,7 @@
           <a:p>
             <a:fld id="{48A87A34-81AB-432B-8DAE-1953F412C126}" type="datetimeFigureOut">
               <a:rPr lang="en-US" dirty="0"/>
-              <a:t>2/18/2020</a:t>
+              <a:t>3/10/2020</a:t>
             </a:fld>
             <a:endParaRPr lang="en-US" dirty="0"/>
           </a:p>
@@ -4811,7 +4811,7 @@
           <a:p>
             <a:fld id="{6D22F896-40B5-4ADD-8801-0D06FADFA095}" type="slidenum">
               <a:rPr lang="en-US" dirty="0"/>
-              <a:t>‹nr.›</a:t>
+              <a:t>‹#›</a:t>
             </a:fld>
             <a:endParaRPr lang="en-US" dirty="0"/>
           </a:p>
@@ -5021,7 +5021,7 @@
           <a:p>
             <a:fld id="{48A87A34-81AB-432B-8DAE-1953F412C126}" type="datetimeFigureOut">
               <a:rPr lang="en-US" dirty="0"/>
-              <a:t>2/18/2020</a:t>
+              <a:t>3/10/2020</a:t>
             </a:fld>
             <a:endParaRPr lang="en-US" dirty="0"/>
           </a:p>
@@ -5063,7 +5063,7 @@
           <a:p>
             <a:fld id="{6D22F896-40B5-4ADD-8801-0D06FADFA095}" type="slidenum">
               <a:rPr lang="en-US" dirty="0"/>
-              <a:t>‹nr.›</a:t>
+              <a:t>‹#›</a:t>
             </a:fld>
             <a:endParaRPr lang="en-US" dirty="0"/>
           </a:p>
@@ -5260,7 +5260,7 @@
             <a:fld id="{48A87A34-81AB-432B-8DAE-1953F412C126}" type="datetimeFigureOut">
               <a:rPr lang="en-US" dirty="0"/>
               <a:pPr/>
-              <a:t>2/18/2020</a:t>
+              <a:t>3/10/2020</a:t>
             </a:fld>
             <a:endParaRPr lang="en-US" dirty="0"/>
           </a:p>
@@ -5339,7 +5339,7 @@
             <a:fld id="{6D22F896-40B5-4ADD-8801-0D06FADFA095}" type="slidenum">
               <a:rPr lang="en-US" dirty="0"/>
               <a:pPr/>
-              <a:t>‹nr.›</a:t>
+              <a:t>‹#›</a:t>
             </a:fld>
             <a:endParaRPr lang="en-US" dirty="0"/>
           </a:p>

</xml_diff>